<commit_message>
Add background image support to PPTX slides and update template
- Implement direct background image insertion for cover/title slides in pptxGenerator_skill.js to enable custom branding
- Update template PPTX and add background_image asset folder
- Revise README to mark PowerPoint generation as complete with PptxGenJS
- Expand allowed Bash commands in settings for testing and development
</commit_message>
<xml_diff>
--- a/azure_function_ppt_v2/template/ncs_ppt_template_2023_revised_wo_general_slide.pptx
+++ b/azure_function_ppt_v2/template/ncs_ppt_template_2023_revised_wo_general_slide.pptx
@@ -660,42 +660,6 @@
           <a:chExt cx="0" cy="0"/>
         </a:xfrm>
       </p:grpSpPr>
-      <p:pic>
-        <p:nvPicPr>
-          <p:cNvPr id="3" name="Picture 2" descr="Background pattern&#10;&#10;Description automatically generated">
-            <a:extLst>
-              <a:ext uri="{FF2B5EF4-FFF2-40B4-BE49-F238E27FC236}">
-                <a16:creationId xmlns:a16="http://schemas.microsoft.com/office/drawing/2014/main" id="{83EDF5CB-B7E0-73C5-BB2B-851680D9A7DD}"/>
-              </a:ext>
-            </a:extLst>
-          </p:cNvPr>
-          <p:cNvPicPr>
-            <a:picLocks noChangeAspect="1"/>
-          </p:cNvPicPr>
-          <p:nvPr userDrawn="1"/>
-        </p:nvPicPr>
-        <p:blipFill>
-          <a:blip r:embed="rId2" cstate="email">
-            <a:extLst>
-              <a:ext uri="{28A0092B-C50C-407E-A947-70E740481C1C}">
-                <a14:useLocalDpi xmlns:a14="http://schemas.microsoft.com/office/drawing/2010/main"/>
-              </a:ext>
-            </a:extLst>
-          </a:blip>
-          <a:stretch>
-            <a:fillRect/>
-          </a:stretch>
-        </p:blipFill>
-        <p:spPr>
-          <a:xfrm>
-            <a:off x="0" y="0"/>
-            <a:ext cx="12192000" cy="6858000"/>
-          </a:xfrm>
-          <a:prstGeom prst="rect">
-            <a:avLst/>
-          </a:prstGeom>
-        </p:spPr>
-      </p:pic>
       <p:sp>
         <p:nvSpPr>
           <p:cNvPr id="13" name="Text Placeholder 12">
@@ -759,14 +723,14 @@
           <p:nvPr userDrawn="1"/>
         </p:nvPicPr>
         <p:blipFill>
-          <a:blip r:embed="rId3" cstate="screen">
+          <a:blip r:embed="rId2" cstate="screen">
             <a:lum bright="100000"/>
             <a:extLst>
               <a:ext uri="{28A0092B-C50C-407E-A947-70E740481C1C}">
                 <a14:useLocalDpi xmlns:a14="http://schemas.microsoft.com/office/drawing/2010/main"/>
               </a:ext>
               <a:ext uri="{96DAC541-7B7A-43D3-8B79-37D633B846F1}">
-                <asvg:svgBlip xmlns:asvg="http://schemas.microsoft.com/office/drawing/2016/SVG/main" r:embed="rId4"/>
+                <asvg:svgBlip xmlns:asvg="http://schemas.microsoft.com/office/drawing/2016/SVG/main" r:embed="rId3"/>
               </a:ext>
             </a:extLst>
           </a:blip>
@@ -5646,42 +5610,6 @@
           <a:chExt cx="0" cy="0"/>
         </a:xfrm>
       </p:grpSpPr>
-      <p:pic>
-        <p:nvPicPr>
-          <p:cNvPr id="2" name="Picture 1" descr="Background pattern&#10;&#10;Description automatically generated">
-            <a:extLst>
-              <a:ext uri="{FF2B5EF4-FFF2-40B4-BE49-F238E27FC236}">
-                <a16:creationId xmlns:a16="http://schemas.microsoft.com/office/drawing/2014/main" id="{54A5E56D-1A28-18CA-E3B8-60F45C89B776}"/>
-              </a:ext>
-            </a:extLst>
-          </p:cNvPr>
-          <p:cNvPicPr>
-            <a:picLocks noChangeAspect="1"/>
-          </p:cNvPicPr>
-          <p:nvPr userDrawn="1"/>
-        </p:nvPicPr>
-        <p:blipFill>
-          <a:blip r:embed="rId2" cstate="email">
-            <a:extLst>
-              <a:ext uri="{28A0092B-C50C-407E-A947-70E740481C1C}">
-                <a14:useLocalDpi xmlns:a14="http://schemas.microsoft.com/office/drawing/2010/main"/>
-              </a:ext>
-            </a:extLst>
-          </a:blip>
-          <a:stretch>
-            <a:fillRect/>
-          </a:stretch>
-        </p:blipFill>
-        <p:spPr>
-          <a:xfrm>
-            <a:off x="0" y="0"/>
-            <a:ext cx="12192000" cy="6858000"/>
-          </a:xfrm>
-          <a:prstGeom prst="rect">
-            <a:avLst/>
-          </a:prstGeom>
-        </p:spPr>
-      </p:pic>
       <p:sp>
         <p:nvSpPr>
           <p:cNvPr id="11" name="Text Placeholder 4">
@@ -6050,13 +5978,13 @@
           <p:nvPr userDrawn="1"/>
         </p:nvPicPr>
         <p:blipFill>
-          <a:blip r:embed="rId3" cstate="screen">
+          <a:blip r:embed="rId2" cstate="screen">
             <a:extLst>
               <a:ext uri="{28A0092B-C50C-407E-A947-70E740481C1C}">
                 <a14:useLocalDpi xmlns:a14="http://schemas.microsoft.com/office/drawing/2010/main"/>
               </a:ext>
               <a:ext uri="{96DAC541-7B7A-43D3-8B79-37D633B846F1}">
-                <asvg:svgBlip xmlns:asvg="http://schemas.microsoft.com/office/drawing/2016/SVG/main" r:embed="rId4"/>
+                <asvg:svgBlip xmlns:asvg="http://schemas.microsoft.com/office/drawing/2016/SVG/main" r:embed="rId3"/>
               </a:ext>
             </a:extLst>
           </a:blip>
@@ -12852,28 +12780,12 @@
 </file>
 
 <file path=customXml/item1.xml><?xml version="1.0" encoding="utf-8"?>
-<p:properties xmlns:p="http://schemas.microsoft.com/office/2006/metadata/properties" xmlns:xsi="http://www.w3.org/2001/XMLSchema-instance" xmlns:pc="http://schemas.microsoft.com/office/infopath/2007/PartnerControls">
-  <documentManagement>
-    <lcf76f155ced4ddcb4097134ff3c332f xmlns="0ec08cb2-ab7c-4bf2-9784-f016f47cdc51">
-      <Terms xmlns="http://schemas.microsoft.com/office/infopath/2007/PartnerControls"/>
-    </lcf76f155ced4ddcb4097134ff3c332f>
-    <TaxCatchAll xmlns="ee2ed37b-27b4-4fa3-9907-ba0fea429c51" xsi:nil="true"/>
-    <MediaLengthInSeconds xmlns="0ec08cb2-ab7c-4bf2-9784-f016f47cdc51" xsi:nil="true"/>
-    <SharedWithUsers xmlns="ee2ed37b-27b4-4fa3-9907-ba0fea429c51">
-      <UserInfo>
-        <DisplayName>Jolene Yuen</DisplayName>
-        <AccountId>1818</AccountId>
-        <AccountType/>
-      </UserInfo>
-      <UserInfo>
-        <DisplayName>Justin Yang</DisplayName>
-        <AccountId>614</AccountId>
-        <AccountType/>
-      </UserInfo>
-    </SharedWithUsers>
-    <Size xmlns="0ec08cb2-ab7c-4bf2-9784-f016f47cdc51" xsi:nil="true"/>
-  </documentManagement>
-</p:properties>
+<?mso-contentType ?>
+<FormTemplates xmlns="http://schemas.microsoft.com/sharepoint/v3/contenttype/forms">
+  <Display>DocumentLibraryForm</Display>
+  <Edit>DocumentLibraryForm</Edit>
+  <New>DocumentLibraryForm</New>
+</FormTemplates>
 </file>
 
 <file path=customXml/item2.xml><?xml version="1.0" encoding="utf-8"?>
@@ -13140,30 +13052,34 @@
 </file>
 
 <file path=customXml/item3.xml><?xml version="1.0" encoding="utf-8"?>
-<?mso-contentType ?>
-<FormTemplates xmlns="http://schemas.microsoft.com/sharepoint/v3/contenttype/forms">
-  <Display>DocumentLibraryForm</Display>
-  <Edit>DocumentLibraryForm</Edit>
-  <New>DocumentLibraryForm</New>
-</FormTemplates>
+<p:properties xmlns:p="http://schemas.microsoft.com/office/2006/metadata/properties" xmlns:xsi="http://www.w3.org/2001/XMLSchema-instance" xmlns:pc="http://schemas.microsoft.com/office/infopath/2007/PartnerControls">
+  <documentManagement>
+    <lcf76f155ced4ddcb4097134ff3c332f xmlns="0ec08cb2-ab7c-4bf2-9784-f016f47cdc51">
+      <Terms xmlns="http://schemas.microsoft.com/office/infopath/2007/PartnerControls"/>
+    </lcf76f155ced4ddcb4097134ff3c332f>
+    <TaxCatchAll xmlns="ee2ed37b-27b4-4fa3-9907-ba0fea429c51" xsi:nil="true"/>
+    <MediaLengthInSeconds xmlns="0ec08cb2-ab7c-4bf2-9784-f016f47cdc51" xsi:nil="true"/>
+    <SharedWithUsers xmlns="ee2ed37b-27b4-4fa3-9907-ba0fea429c51">
+      <UserInfo>
+        <DisplayName>Jolene Yuen</DisplayName>
+        <AccountId>1818</AccountId>
+        <AccountType/>
+      </UserInfo>
+      <UserInfo>
+        <DisplayName>Justin Yang</DisplayName>
+        <AccountId>614</AccountId>
+        <AccountType/>
+      </UserInfo>
+    </SharedWithUsers>
+    <Size xmlns="0ec08cb2-ab7c-4bf2-9784-f016f47cdc51" xsi:nil="true"/>
+  </documentManagement>
+</p:properties>
 </file>
 
 <file path=customXml/itemProps1.xml><?xml version="1.0" encoding="utf-8"?>
-<ds:datastoreItem xmlns:ds="http://schemas.openxmlformats.org/officeDocument/2006/customXml" ds:itemID="{DD645BDE-075B-4C01-B810-3203EB500D0D}">
+<ds:datastoreItem xmlns:ds="http://schemas.openxmlformats.org/officeDocument/2006/customXml" ds:itemID="{6BCBB70C-2BCC-4239-ACE0-CFA6AFFAA6BD}">
   <ds:schemaRefs>
-    <ds:schemaRef ds:uri="http://schemas.openxmlformats.org/package/2006/metadata/core-properties"/>
-    <ds:schemaRef ds:uri="http://purl.org/dc/elements/1.1/"/>
-    <ds:schemaRef ds:uri="http://purl.org/dc/dcmitype/"/>
-    <ds:schemaRef ds:uri="http://www.w3.org/XML/1998/namespace"/>
-    <ds:schemaRef ds:uri="http://purl.org/dc/terms/"/>
-    <ds:schemaRef ds:uri="http://schemas.microsoft.com/office/2006/documentManagement/types"/>
-    <ds:schemaRef ds:uri="http://schemas.microsoft.com/office/infopath/2007/PartnerControls"/>
-    <ds:schemaRef ds:uri="d2a93d74-f6e3-48a0-863c-b69df431d8ab"/>
-    <ds:schemaRef ds:uri="e6592984-f751-4627-a1ed-0d97108e7e78"/>
-    <ds:schemaRef ds:uri="f076d96e-05a5-45a8-8460-4ccc7c61843d"/>
-    <ds:schemaRef ds:uri="http://schemas.microsoft.com/office/2006/metadata/properties"/>
-    <ds:schemaRef ds:uri="0ec08cb2-ab7c-4bf2-9784-f016f47cdc51"/>
-    <ds:schemaRef ds:uri="ee2ed37b-27b4-4fa3-9907-ba0fea429c51"/>
+    <ds:schemaRef ds:uri="http://schemas.microsoft.com/sharepoint/v3/contenttype/forms"/>
   </ds:schemaRefs>
 </ds:datastoreItem>
 </file>
@@ -13188,9 +13104,21 @@
 </file>
 
 <file path=customXml/itemProps3.xml><?xml version="1.0" encoding="utf-8"?>
-<ds:datastoreItem xmlns:ds="http://schemas.openxmlformats.org/officeDocument/2006/customXml" ds:itemID="{6BCBB70C-2BCC-4239-ACE0-CFA6AFFAA6BD}">
+<ds:datastoreItem xmlns:ds="http://schemas.openxmlformats.org/officeDocument/2006/customXml" ds:itemID="{DD645BDE-075B-4C01-B810-3203EB500D0D}">
   <ds:schemaRefs>
-    <ds:schemaRef ds:uri="http://schemas.microsoft.com/sharepoint/v3/contenttype/forms"/>
+    <ds:schemaRef ds:uri="http://schemas.openxmlformats.org/package/2006/metadata/core-properties"/>
+    <ds:schemaRef ds:uri="http://purl.org/dc/elements/1.1/"/>
+    <ds:schemaRef ds:uri="http://purl.org/dc/dcmitype/"/>
+    <ds:schemaRef ds:uri="http://www.w3.org/XML/1998/namespace"/>
+    <ds:schemaRef ds:uri="http://purl.org/dc/terms/"/>
+    <ds:schemaRef ds:uri="http://schemas.microsoft.com/office/2006/documentManagement/types"/>
+    <ds:schemaRef ds:uri="http://schemas.microsoft.com/office/infopath/2007/PartnerControls"/>
+    <ds:schemaRef ds:uri="d2a93d74-f6e3-48a0-863c-b69df431d8ab"/>
+    <ds:schemaRef ds:uri="e6592984-f751-4627-a1ed-0d97108e7e78"/>
+    <ds:schemaRef ds:uri="f076d96e-05a5-45a8-8460-4ccc7c61843d"/>
+    <ds:schemaRef ds:uri="http://schemas.microsoft.com/office/2006/metadata/properties"/>
+    <ds:schemaRef ds:uri="0ec08cb2-ab7c-4bf2-9784-f016f47cdc51"/>
+    <ds:schemaRef ds:uri="ee2ed37b-27b4-4fa3-9907-ba0fea429c51"/>
   </ds:schemaRefs>
 </ds:datastoreItem>
 </file>
</xml_diff>